<commit_message>
D3.1 and new version of the work plan
</commit_message>
<xml_diff>
--- a/docs/posters/CSSR4Africa.pptx
+++ b/docs/posters/CSSR4Africa.pptx
@@ -257,7 +257,7 @@
       </p15:sldGuideLst>
     </p:ext>
     <p:ext uri="http://customooxmlschemas.google.com/">
-      <go:slidesCustomData xmlns="" xmlns:mc="http://schemas.openxmlformats.org/markup-compatibility/2006" xmlns:mv="urn:schemas-microsoft-com:mac:vml" xmlns:c="http://schemas.openxmlformats.org/drawingml/2006/chart" xmlns:dgm="http://schemas.openxmlformats.org/drawingml/2006/diagram" xmlns:o="urn:schemas-microsoft-com:office:office" xmlns:v="urn:schemas-microsoft-com:vml" xmlns:pvml="urn:schemas-microsoft-com:office:powerpoint" xmlns:com="http://schemas.openxmlformats.org/drawingml/2006/compatibility" xmlns:p14="http://schemas.microsoft.com/office/powerpoint/2010/main" xmlns:p15="http://schemas.microsoft.com/office/powerpoint/2012/main" xmlns:ahyp="http://schemas.microsoft.com/office/drawing/2018/hyperlinkcolor" xmlns:go="http://customooxmlschemas.google.com/" r:id="rId7" roundtripDataSignature="AMtx7mhAKJbsIYXkN4OuM+39RpEcRPfEPw=="/>
+      <go:slidesCustomData xmlns:go="http://customooxmlschemas.google.com/" xmlns:ahyp="http://schemas.microsoft.com/office/drawing/2018/hyperlinkcolor" xmlns:p15="http://schemas.microsoft.com/office/powerpoint/2012/main" xmlns:p14="http://schemas.microsoft.com/office/powerpoint/2010/main" xmlns:com="http://schemas.openxmlformats.org/drawingml/2006/compatibility" xmlns:pvml="urn:schemas-microsoft-com:office:powerpoint" xmlns:v="urn:schemas-microsoft-com:vml" xmlns:o="urn:schemas-microsoft-com:office:office" xmlns:dgm="http://schemas.openxmlformats.org/drawingml/2006/diagram" xmlns:c="http://schemas.openxmlformats.org/drawingml/2006/chart" xmlns:mv="urn:schemas-microsoft-com:mac:vml" xmlns:mc="http://schemas.openxmlformats.org/markup-compatibility/2006" xmlns="" r:id="rId7" roundtripDataSignature="AMtx7mhAKJbsIYXkN4OuM+39RpEcRPfEPw=="/>
     </p:ext>
   </p:extLst>
 </p:presentation>
@@ -11426,7 +11426,7 @@
                 </a:solidFill>
                 <a:latin typeface="Avenir Book" panose="02000503020000020003" pitchFamily="2" charset="0"/>
               </a:rPr>
-              <a:t> and Vernon 2023).</a:t>
+              <a:t> and Vernon 2023)</a:t>
             </a:r>
             <a:endParaRPr lang="en-RW" sz="2800" b="1" dirty="0">
               <a:solidFill>
@@ -11495,7 +11495,7 @@
         </p:nvSpPr>
         <p:spPr>
           <a:xfrm>
-            <a:off x="817594" y="9111849"/>
+            <a:off x="825042" y="9111849"/>
             <a:ext cx="31634380" cy="6001643"/>
           </a:xfrm>
           <a:prstGeom prst="rect">
@@ -11713,8 +11713,8 @@
         </p:nvSpPr>
         <p:spPr>
           <a:xfrm>
-            <a:off x="770178" y="36556362"/>
-            <a:ext cx="31663457" cy="4524315"/>
+            <a:off x="770178" y="36874416"/>
+            <a:ext cx="31663457" cy="4339650"/>
           </a:xfrm>
           <a:prstGeom prst="rect">
             <a:avLst/>
@@ -11728,64 +11728,15 @@
           <a:lstStyle/>
           <a:p>
             <a:r>
-              <a:rPr lang="en-US" sz="2400" b="1" dirty="0">
+              <a:rPr lang="en-RW" sz="3600" b="1" dirty="0">
                 <a:solidFill>
                   <a:schemeClr val="tx1"/>
                 </a:solidFill>
                 <a:latin typeface="Avenir Book" panose="02000503020000020003" pitchFamily="2" charset="0"/>
               </a:rPr>
-              <a:t>Publications</a:t>
+              <a:t>References</a:t>
             </a:r>
-          </a:p>
-          <a:p>
-            <a:r>
-              <a:rPr lang="en-US" sz="2400" dirty="0">
-                <a:solidFill>
-                  <a:schemeClr val="tx1"/>
-                </a:solidFill>
-                <a:latin typeface="Avenir Book" panose="02000503020000020003" pitchFamily="2" charset="0"/>
-              </a:rPr>
-              <a:t>A. </a:t>
-            </a:r>
-            <a:r>
-              <a:rPr lang="en-US" sz="2400" dirty="0" err="1">
-                <a:solidFill>
-                  <a:schemeClr val="tx1"/>
-                </a:solidFill>
-                <a:latin typeface="Avenir Book" panose="02000503020000020003" pitchFamily="2" charset="0"/>
-              </a:rPr>
-              <a:t>Akinade</a:t>
-            </a:r>
-            <a:r>
-              <a:rPr lang="en-US" sz="2400" dirty="0">
-                <a:solidFill>
-                  <a:schemeClr val="tx1"/>
-                </a:solidFill>
-                <a:latin typeface="Avenir Book" panose="02000503020000020003" pitchFamily="2" charset="0"/>
-              </a:rPr>
-              <a:t>, Y. Haile, N. </a:t>
-            </a:r>
-            <a:r>
-              <a:rPr lang="en-US" sz="2400" dirty="0" err="1">
-                <a:solidFill>
-                  <a:schemeClr val="tx1"/>
-                </a:solidFill>
-                <a:latin typeface="Avenir Book" panose="02000503020000020003" pitchFamily="2" charset="0"/>
-              </a:rPr>
-              <a:t>Mutangana</a:t>
-            </a:r>
-            <a:r>
-              <a:rPr lang="en-US" sz="2400" dirty="0">
-                <a:solidFill>
-                  <a:schemeClr val="tx1"/>
-                </a:solidFill>
-                <a:latin typeface="Avenir Book" panose="02000503020000020003" pitchFamily="2" charset="0"/>
-              </a:rPr>
-              <a:t> C. Tucker, and D. Vernon, “Culturally Competent Social Robots Target Inclusion in Africa”, Science Robotics, 2023.  </a:t>
-            </a:r>
-          </a:p>
-          <a:p>
-            <a:endParaRPr lang="en-US" sz="2400" dirty="0">
+            <a:endParaRPr lang="en-US" sz="3600" b="1" dirty="0">
               <a:solidFill>
                 <a:schemeClr val="tx1"/>
               </a:solidFill>
@@ -11793,115 +11744,7 @@
             </a:endParaRPr>
           </a:p>
           <a:p>
-            <a:r>
-              <a:rPr lang="en-US" sz="2400" dirty="0">
-                <a:solidFill>
-                  <a:schemeClr val="tx1"/>
-                </a:solidFill>
-                <a:latin typeface="Avenir Book" panose="02000503020000020003" pitchFamily="2" charset="0"/>
-              </a:rPr>
-              <a:t>P. </a:t>
-            </a:r>
-            <a:r>
-              <a:rPr lang="en-US" sz="2400" dirty="0" err="1">
-                <a:solidFill>
-                  <a:schemeClr val="tx1"/>
-                </a:solidFill>
-                <a:latin typeface="Avenir Book" panose="02000503020000020003" pitchFamily="2" charset="0"/>
-              </a:rPr>
-              <a:t>Zantou</a:t>
-            </a:r>
-            <a:r>
-              <a:rPr lang="en-US" sz="2400" dirty="0">
-                <a:solidFill>
-                  <a:schemeClr val="tx1"/>
-                </a:solidFill>
-                <a:latin typeface="Avenir Book" panose="02000503020000020003" pitchFamily="2" charset="0"/>
-              </a:rPr>
-              <a:t> and D. Vernon, “Culturally-Sensitive Human-Robot Interaction: A Case Study with the Pepper Humanoid Robot”, Proc. IEEE </a:t>
-            </a:r>
-            <a:r>
-              <a:rPr lang="en-US" sz="2400" dirty="0" err="1">
-                <a:solidFill>
-                  <a:schemeClr val="tx1"/>
-                </a:solidFill>
-                <a:latin typeface="Avenir Book" panose="02000503020000020003" pitchFamily="2" charset="0"/>
-              </a:rPr>
-              <a:t>Africon</a:t>
-            </a:r>
-            <a:r>
-              <a:rPr lang="en-US" sz="2400" dirty="0">
-                <a:solidFill>
-                  <a:schemeClr val="tx1"/>
-                </a:solidFill>
-                <a:latin typeface="Avenir Book" panose="02000503020000020003" pitchFamily="2" charset="0"/>
-              </a:rPr>
-              <a:t>, Nairobi, Kenya, September, 2023.  </a:t>
-            </a:r>
-          </a:p>
-          <a:p>
-            <a:endParaRPr lang="en-US" sz="2400" dirty="0">
-              <a:solidFill>
-                <a:schemeClr val="tx1"/>
-              </a:solidFill>
-              <a:latin typeface="Avenir Book" panose="02000503020000020003" pitchFamily="2" charset="0"/>
-            </a:endParaRPr>
-          </a:p>
-          <a:p>
-            <a:r>
-              <a:rPr lang="en-US" sz="2400" dirty="0">
-                <a:solidFill>
-                  <a:schemeClr val="tx1"/>
-                </a:solidFill>
-                <a:latin typeface="Avenir Book" panose="02000503020000020003" pitchFamily="2" charset="0"/>
-              </a:rPr>
-              <a:t>P. </a:t>
-            </a:r>
-            <a:r>
-              <a:rPr lang="en-US" sz="2400" dirty="0" err="1">
-                <a:solidFill>
-                  <a:schemeClr val="tx1"/>
-                </a:solidFill>
-                <a:latin typeface="Avenir Book" panose="02000503020000020003" pitchFamily="2" charset="0"/>
-              </a:rPr>
-              <a:t>Zantou</a:t>
-            </a:r>
-            <a:r>
-              <a:rPr lang="en-US" sz="2400" dirty="0">
-                <a:solidFill>
-                  <a:schemeClr val="tx1"/>
-                </a:solidFill>
-                <a:latin typeface="Avenir Book" panose="02000503020000020003" pitchFamily="2" charset="0"/>
-              </a:rPr>
-              <a:t> and D. Vernon, “Inclusion Drives Sustainable Development: The Case of Social Robotics for Africa”, Poster Presentation, ACM SIGCAS/SIGCHI Conference on Computing and Sustainable Societies - COMPASS, August 2023. </a:t>
-            </a:r>
-          </a:p>
-          <a:p>
-            <a:endParaRPr lang="en-US" sz="2400" dirty="0">
-              <a:solidFill>
-                <a:schemeClr val="tx1"/>
-              </a:solidFill>
-              <a:latin typeface="Avenir Book" panose="02000503020000020003" pitchFamily="2" charset="0"/>
-            </a:endParaRPr>
-          </a:p>
-          <a:p>
-            <a:r>
-              <a:rPr lang="en-US" sz="2400" b="1" dirty="0">
-                <a:solidFill>
-                  <a:schemeClr val="tx1"/>
-                </a:solidFill>
-                <a:latin typeface="Avenir Book" panose="02000503020000020003" pitchFamily="2" charset="0"/>
-              </a:rPr>
-              <a:t>References</a:t>
-            </a:r>
-            <a:br>
-              <a:rPr lang="en-US" sz="2400" dirty="0">
-                <a:solidFill>
-                  <a:schemeClr val="tx1"/>
-                </a:solidFill>
-                <a:latin typeface="Avenir Book" panose="02000503020000020003" pitchFamily="2" charset="0"/>
-              </a:rPr>
-            </a:br>
+            <a:pPr marL="415925" indent="-398463"/>
             <a:r>
               <a:rPr lang="en-US" sz="2400" dirty="0">
                 <a:solidFill>
@@ -11964,6 +11807,358 @@
                 <a:latin typeface="Avenir Book" panose="02000503020000020003" pitchFamily="2" charset="0"/>
               </a:rPr>
               <a:t>, “Paving the way for culturally competent robots: A position paper”, in 26th IEEE International Symposium on Robot and Human Interactive Communication (RO-MAN), Lisbon, Portugal, 2017, pp. 553-560.</a:t>
+            </a:r>
+          </a:p>
+          <a:p>
+            <a:pPr marL="415925" indent="-398463"/>
+            <a:r>
+              <a:rPr lang="en-US" sz="2400" dirty="0">
+                <a:solidFill>
+                  <a:schemeClr val="tx1"/>
+                </a:solidFill>
+                <a:latin typeface="Avenir Book" panose="02000503020000020003" pitchFamily="2" charset="0"/>
+              </a:rPr>
+              <a:t>B. Bruno, C. T. </a:t>
+            </a:r>
+            <a:r>
+              <a:rPr lang="en-US" sz="2400" dirty="0" err="1">
+                <a:solidFill>
+                  <a:schemeClr val="tx1"/>
+                </a:solidFill>
+                <a:latin typeface="Avenir Book" panose="02000503020000020003" pitchFamily="2" charset="0"/>
+              </a:rPr>
+              <a:t>Recchiuto</a:t>
+            </a:r>
+            <a:r>
+              <a:rPr lang="en-US" sz="2400" dirty="0">
+                <a:solidFill>
+                  <a:schemeClr val="tx1"/>
+                </a:solidFill>
+                <a:latin typeface="Avenir Book" panose="02000503020000020003" pitchFamily="2" charset="0"/>
+              </a:rPr>
+              <a:t>, I. Papadopoulos, A. </a:t>
+            </a:r>
+            <a:r>
+              <a:rPr lang="en-US" sz="2400" dirty="0" err="1">
+                <a:solidFill>
+                  <a:schemeClr val="tx1"/>
+                </a:solidFill>
+                <a:latin typeface="Avenir Book" panose="02000503020000020003" pitchFamily="2" charset="0"/>
+              </a:rPr>
+              <a:t>Saffiotti</a:t>
+            </a:r>
+            <a:r>
+              <a:rPr lang="en-US" sz="2400" dirty="0">
+                <a:solidFill>
+                  <a:schemeClr val="tx1"/>
+                </a:solidFill>
+                <a:latin typeface="Avenir Book" panose="02000503020000020003" pitchFamily="2" charset="0"/>
+              </a:rPr>
+              <a:t>, C. </a:t>
+            </a:r>
+            <a:r>
+              <a:rPr lang="en-US" sz="2400" dirty="0" err="1">
+                <a:solidFill>
+                  <a:schemeClr val="tx1"/>
+                </a:solidFill>
+                <a:latin typeface="Avenir Book" panose="02000503020000020003" pitchFamily="2" charset="0"/>
+              </a:rPr>
+              <a:t>Koulouglioti</a:t>
+            </a:r>
+            <a:r>
+              <a:rPr lang="en-US" sz="2400" dirty="0">
+                <a:solidFill>
+                  <a:schemeClr val="tx1"/>
+                </a:solidFill>
+                <a:latin typeface="Avenir Book" panose="02000503020000020003" pitchFamily="2" charset="0"/>
+              </a:rPr>
+              <a:t>, R. </a:t>
+            </a:r>
+            <a:r>
+              <a:rPr lang="en-US" sz="2400" dirty="0" err="1">
+                <a:solidFill>
+                  <a:schemeClr val="tx1"/>
+                </a:solidFill>
+                <a:latin typeface="Avenir Book" panose="02000503020000020003" pitchFamily="2" charset="0"/>
+              </a:rPr>
+              <a:t>Menicatti</a:t>
+            </a:r>
+            <a:r>
+              <a:rPr lang="en-US" sz="2400" dirty="0">
+                <a:solidFill>
+                  <a:schemeClr val="tx1"/>
+                </a:solidFill>
+                <a:latin typeface="Avenir Book" panose="02000503020000020003" pitchFamily="2" charset="0"/>
+              </a:rPr>
+              <a:t>, F. </a:t>
+            </a:r>
+            <a:r>
+              <a:rPr lang="en-US" sz="2400" dirty="0" err="1">
+                <a:solidFill>
+                  <a:schemeClr val="tx1"/>
+                </a:solidFill>
+                <a:latin typeface="Avenir Book" panose="02000503020000020003" pitchFamily="2" charset="0"/>
+              </a:rPr>
+              <a:t>Mastrogiovanni</a:t>
+            </a:r>
+            <a:r>
+              <a:rPr lang="en-US" sz="2400" dirty="0">
+                <a:solidFill>
+                  <a:schemeClr val="tx1"/>
+                </a:solidFill>
+                <a:latin typeface="Avenir Book" panose="02000503020000020003" pitchFamily="2" charset="0"/>
+              </a:rPr>
+              <a:t>, R. </a:t>
+            </a:r>
+            <a:r>
+              <a:rPr lang="en-US" sz="2400" dirty="0" err="1">
+                <a:solidFill>
+                  <a:schemeClr val="tx1"/>
+                </a:solidFill>
+                <a:latin typeface="Avenir Book" panose="02000503020000020003" pitchFamily="2" charset="0"/>
+              </a:rPr>
+              <a:t>Zaccaria</a:t>
+            </a:r>
+            <a:r>
+              <a:rPr lang="en-US" sz="2400" dirty="0">
+                <a:solidFill>
+                  <a:schemeClr val="tx1"/>
+                </a:solidFill>
+                <a:latin typeface="Avenir Book" panose="02000503020000020003" pitchFamily="2" charset="0"/>
+              </a:rPr>
+              <a:t>, and A. </a:t>
+            </a:r>
+            <a:r>
+              <a:rPr lang="en-US" sz="2400" dirty="0" err="1">
+                <a:solidFill>
+                  <a:schemeClr val="tx1"/>
+                </a:solidFill>
+                <a:latin typeface="Avenir Book" panose="02000503020000020003" pitchFamily="2" charset="0"/>
+              </a:rPr>
+              <a:t>Sgorbissa</a:t>
+            </a:r>
+            <a:r>
+              <a:rPr lang="en-US" sz="2400" dirty="0">
+                <a:solidFill>
+                  <a:schemeClr val="tx1"/>
+                </a:solidFill>
+                <a:latin typeface="Avenir Book" panose="02000503020000020003" pitchFamily="2" charset="0"/>
+              </a:rPr>
+              <a:t>, “Knowledge representation for culturally competent personal robots: requirements, design principles, implementation, and assessment,” International Journal of Social Robotics, vol. 11, no. 3, pp. 515–538, 2019.</a:t>
+            </a:r>
+          </a:p>
+          <a:p>
+            <a:r>
+              <a:rPr lang="en-US" sz="2400" dirty="0">
+                <a:solidFill>
+                  <a:schemeClr val="tx1"/>
+                </a:solidFill>
+                <a:latin typeface="Avenir Book" panose="02000503020000020003" pitchFamily="2" charset="0"/>
+              </a:rPr>
+              <a:t>A. </a:t>
+            </a:r>
+            <a:r>
+              <a:rPr lang="en-US" sz="2400" dirty="0" err="1">
+                <a:solidFill>
+                  <a:schemeClr val="tx1"/>
+                </a:solidFill>
+                <a:latin typeface="Avenir Book" panose="02000503020000020003" pitchFamily="2" charset="0"/>
+              </a:rPr>
+              <a:t>Akinade</a:t>
+            </a:r>
+            <a:r>
+              <a:rPr lang="en-US" sz="2400" dirty="0">
+                <a:solidFill>
+                  <a:schemeClr val="tx1"/>
+                </a:solidFill>
+                <a:latin typeface="Avenir Book" panose="02000503020000020003" pitchFamily="2" charset="0"/>
+              </a:rPr>
+              <a:t>, Y. Haile, N. </a:t>
+            </a:r>
+            <a:r>
+              <a:rPr lang="en-US" sz="2400" dirty="0" err="1">
+                <a:solidFill>
+                  <a:schemeClr val="tx1"/>
+                </a:solidFill>
+                <a:latin typeface="Avenir Book" panose="02000503020000020003" pitchFamily="2" charset="0"/>
+              </a:rPr>
+              <a:t>Mutangana</a:t>
+            </a:r>
+            <a:r>
+              <a:rPr lang="en-US" sz="2400" dirty="0">
+                <a:solidFill>
+                  <a:schemeClr val="tx1"/>
+                </a:solidFill>
+                <a:latin typeface="Avenir Book" panose="02000503020000020003" pitchFamily="2" charset="0"/>
+              </a:rPr>
+              <a:t> C. Tucker, and D. Vernon, “Culturally Competent Social Robots Target Inclusion in Africa”, Science Robotics, 2023.  </a:t>
+            </a:r>
+          </a:p>
+          <a:p>
+            <a:r>
+              <a:rPr lang="en-US" sz="2400" dirty="0">
+                <a:solidFill>
+                  <a:schemeClr val="tx1"/>
+                </a:solidFill>
+                <a:latin typeface="Avenir Book" panose="02000503020000020003" pitchFamily="2" charset="0"/>
+              </a:rPr>
+              <a:t>P. </a:t>
+            </a:r>
+            <a:r>
+              <a:rPr lang="en-US" sz="2400" dirty="0" err="1">
+                <a:solidFill>
+                  <a:schemeClr val="tx1"/>
+                </a:solidFill>
+                <a:latin typeface="Avenir Book" panose="02000503020000020003" pitchFamily="2" charset="0"/>
+              </a:rPr>
+              <a:t>Zantou</a:t>
+            </a:r>
+            <a:r>
+              <a:rPr lang="en-US" sz="2400" dirty="0">
+                <a:solidFill>
+                  <a:schemeClr val="tx1"/>
+                </a:solidFill>
+                <a:latin typeface="Avenir Book" panose="02000503020000020003" pitchFamily="2" charset="0"/>
+              </a:rPr>
+              <a:t> and D. Vernon, “Culturally-Sensitive Human-Robot Interaction: A Case Study with the Pepper Humanoid Robot”, Proc. IEEE </a:t>
+            </a:r>
+            <a:r>
+              <a:rPr lang="en-US" sz="2400" dirty="0" err="1">
+                <a:solidFill>
+                  <a:schemeClr val="tx1"/>
+                </a:solidFill>
+                <a:latin typeface="Avenir Book" panose="02000503020000020003" pitchFamily="2" charset="0"/>
+              </a:rPr>
+              <a:t>Africon</a:t>
+            </a:r>
+            <a:r>
+              <a:rPr lang="en-US" sz="2400" dirty="0">
+                <a:solidFill>
+                  <a:schemeClr val="tx1"/>
+                </a:solidFill>
+                <a:latin typeface="Avenir Book" panose="02000503020000020003" pitchFamily="2" charset="0"/>
+              </a:rPr>
+              <a:t>, Nairobi, Kenya, September, 2023.  </a:t>
+            </a:r>
+          </a:p>
+          <a:p>
+            <a:pPr marL="725488" indent="-708025"/>
+            <a:r>
+              <a:rPr lang="en-US" sz="2400" dirty="0">
+                <a:solidFill>
+                  <a:schemeClr val="tx1"/>
+                </a:solidFill>
+                <a:latin typeface="Avenir Book" panose="02000503020000020003" pitchFamily="2" charset="0"/>
+              </a:rPr>
+              <a:t>P. </a:t>
+            </a:r>
+            <a:r>
+              <a:rPr lang="en-US" sz="2400" dirty="0" err="1">
+                <a:solidFill>
+                  <a:schemeClr val="tx1"/>
+                </a:solidFill>
+                <a:latin typeface="Avenir Book" panose="02000503020000020003" pitchFamily="2" charset="0"/>
+              </a:rPr>
+              <a:t>Zantou</a:t>
+            </a:r>
+            <a:r>
+              <a:rPr lang="en-US" sz="2400" dirty="0">
+                <a:solidFill>
+                  <a:schemeClr val="tx1"/>
+                </a:solidFill>
+                <a:latin typeface="Avenir Book" panose="02000503020000020003" pitchFamily="2" charset="0"/>
+              </a:rPr>
+              <a:t> and D. Vernon, “Inclusion Drives Sustainable Development: The Case of Social Robotics for Africa”, Poster Presentation, ACM SIGCAS/SIGCHI Conference on Computing and Sustainable Societies - COMPASS, 2023. </a:t>
+            </a:r>
+            <a:endParaRPr lang="en-US" sz="2400" b="1" dirty="0">
+              <a:solidFill>
+                <a:schemeClr val="tx1"/>
+              </a:solidFill>
+              <a:latin typeface="Avenir Book" panose="02000503020000020003" pitchFamily="2" charset="0"/>
+            </a:endParaRPr>
+          </a:p>
+          <a:p>
+            <a:pPr marL="415925" indent="-398463"/>
+            <a:r>
+              <a:rPr lang="en-US" sz="2400" dirty="0">
+                <a:solidFill>
+                  <a:schemeClr val="tx1"/>
+                </a:solidFill>
+                <a:latin typeface="Avenir Book" panose="02000503020000020003" pitchFamily="2" charset="0"/>
+              </a:rPr>
+              <a:t>A. Khaliq, U. </a:t>
+            </a:r>
+            <a:r>
+              <a:rPr lang="en-US" sz="2400" dirty="0" err="1">
+                <a:solidFill>
+                  <a:schemeClr val="tx1"/>
+                </a:solidFill>
+                <a:latin typeface="Avenir Book" panose="02000503020000020003" pitchFamily="2" charset="0"/>
+              </a:rPr>
+              <a:t>Kockemann</a:t>
+            </a:r>
+            <a:r>
+              <a:rPr lang="en-US" sz="2400" dirty="0">
+                <a:solidFill>
+                  <a:schemeClr val="tx1"/>
+                </a:solidFill>
+                <a:latin typeface="Avenir Book" panose="02000503020000020003" pitchFamily="2" charset="0"/>
+              </a:rPr>
+              <a:t>, F. Pecora, A. </a:t>
+            </a:r>
+            <a:r>
+              <a:rPr lang="en-US" sz="2400" dirty="0" err="1">
+                <a:solidFill>
+                  <a:schemeClr val="tx1"/>
+                </a:solidFill>
+                <a:latin typeface="Avenir Book" panose="02000503020000020003" pitchFamily="2" charset="0"/>
+              </a:rPr>
+              <a:t>Saffiotti</a:t>
+            </a:r>
+            <a:r>
+              <a:rPr lang="en-US" sz="2400" dirty="0">
+                <a:solidFill>
+                  <a:schemeClr val="tx1"/>
+                </a:solidFill>
+                <a:latin typeface="Avenir Book" panose="02000503020000020003" pitchFamily="2" charset="0"/>
+              </a:rPr>
+              <a:t>, B. Bruno, C. </a:t>
+            </a:r>
+            <a:r>
+              <a:rPr lang="en-US" sz="2400" dirty="0" err="1">
+                <a:solidFill>
+                  <a:schemeClr val="tx1"/>
+                </a:solidFill>
+                <a:latin typeface="Avenir Book" panose="02000503020000020003" pitchFamily="2" charset="0"/>
+              </a:rPr>
+              <a:t>Recchiuto</a:t>
+            </a:r>
+            <a:r>
+              <a:rPr lang="en-US" sz="2400" dirty="0">
+                <a:solidFill>
+                  <a:schemeClr val="tx1"/>
+                </a:solidFill>
+                <a:latin typeface="Avenir Book" panose="02000503020000020003" pitchFamily="2" charset="0"/>
+              </a:rPr>
+              <a:t>, A. </a:t>
+            </a:r>
+            <a:r>
+              <a:rPr lang="en-US" sz="2400" dirty="0" err="1">
+                <a:solidFill>
+                  <a:schemeClr val="tx1"/>
+                </a:solidFill>
+                <a:latin typeface="Avenir Book" panose="02000503020000020003" pitchFamily="2" charset="0"/>
+              </a:rPr>
+              <a:t>Sgorbissa</a:t>
+            </a:r>
+            <a:r>
+              <a:rPr lang="en-US" sz="2400" dirty="0">
+                <a:solidFill>
+                  <a:schemeClr val="tx1"/>
+                </a:solidFill>
+                <a:latin typeface="Avenir Book" panose="02000503020000020003" pitchFamily="2" charset="0"/>
+              </a:rPr>
+              <a:t>, H.-D. Bui, and N. Chong, “Culturally aware planning and execution of robot actions,” in IEEE/RSJ International Conference on Intelligent Robots and Systems (IROS), 2018, pp. 326–332.</a:t>
             </a:r>
           </a:p>
           <a:p>
@@ -12200,8 +12395,8 @@
         </p:nvSpPr>
         <p:spPr>
           <a:xfrm>
-            <a:off x="22793760" y="27675015"/>
-            <a:ext cx="5782352" cy="523220"/>
+            <a:off x="23122944" y="36005722"/>
+            <a:ext cx="4172937" cy="400110"/>
           </a:xfrm>
           <a:prstGeom prst="rect">
             <a:avLst/>
@@ -12215,13 +12410,13 @@
           <a:lstStyle/>
           <a:p>
             <a:r>
-              <a:rPr lang="en-RW" sz="2800" b="1" dirty="0">
+              <a:rPr lang="en-RW" sz="2000" b="1" dirty="0">
                 <a:solidFill>
                   <a:schemeClr val="tx1"/>
                 </a:solidFill>
                 <a:latin typeface="Avenir Book" panose="02000503020000020003" pitchFamily="2" charset="0"/>
               </a:rPr>
-              <a:t>CSSR4Africa System Architecture.</a:t>
+              <a:t>CSSR4Africa System Architecture </a:t>
             </a:r>
           </a:p>
         </p:txBody>
@@ -12282,7 +12477,7 @@
         <p:spPr>
           <a:xfrm>
             <a:off x="11942635" y="3595009"/>
-            <a:ext cx="9384299" cy="2062103"/>
+            <a:ext cx="9384300" cy="2123658"/>
           </a:xfrm>
           <a:prstGeom prst="rect">
             <a:avLst/>
@@ -12297,7 +12492,7 @@
           <a:p>
             <a:pPr algn="ctr"/>
             <a:r>
-              <a:rPr lang="en-RW" sz="3200" b="1" dirty="0">
+              <a:rPr lang="en-RW" sz="3600" b="1" dirty="0">
                 <a:solidFill>
                   <a:schemeClr val="tx1"/>
                 </a:solidFill>
@@ -12372,6 +12567,126 @@
                 <a:latin typeface="Avenir Book" panose="02000503020000020003" pitchFamily="2" charset="0"/>
               </a:rPr>
               <a:t>Benjamin Rosman, University of the Witwatersrand</a:t>
+            </a:r>
+          </a:p>
+        </p:txBody>
+      </p:sp>
+      <p:sp>
+        <p:nvSpPr>
+          <p:cNvPr id="4" name="TextBox 3">
+            <a:extLst>
+              <a:ext uri="{FF2B5EF4-FFF2-40B4-BE49-F238E27FC236}">
+                <a16:creationId xmlns:a16="http://schemas.microsoft.com/office/drawing/2014/main" id="{6A74DC62-30C7-9688-F5DD-5FC38C245B92}"/>
+              </a:ext>
+            </a:extLst>
+          </p:cNvPr>
+          <p:cNvSpPr txBox="1"/>
+          <p:nvPr/>
+        </p:nvSpPr>
+        <p:spPr>
+          <a:xfrm>
+            <a:off x="825042" y="8327422"/>
+            <a:ext cx="2867123" cy="646331"/>
+          </a:xfrm>
+          <a:prstGeom prst="rect">
+            <a:avLst/>
+          </a:prstGeom>
+          <a:noFill/>
+        </p:spPr>
+        <p:txBody>
+          <a:bodyPr wrap="none" rtlCol="0">
+            <a:spAutoFit/>
+          </a:bodyPr>
+          <a:lstStyle/>
+          <a:p>
+            <a:r>
+              <a:rPr lang="en-RW" sz="3600" b="1" dirty="0">
+                <a:solidFill>
+                  <a:schemeClr val="tx1"/>
+                </a:solidFill>
+                <a:latin typeface="Avenir Book" panose="02000503020000020003" pitchFamily="2" charset="0"/>
+              </a:rPr>
+              <a:t>Research Goals</a:t>
+            </a:r>
+          </a:p>
+        </p:txBody>
+      </p:sp>
+      <p:sp>
+        <p:nvSpPr>
+          <p:cNvPr id="5" name="TextBox 4">
+            <a:extLst>
+              <a:ext uri="{FF2B5EF4-FFF2-40B4-BE49-F238E27FC236}">
+                <a16:creationId xmlns:a16="http://schemas.microsoft.com/office/drawing/2014/main" id="{DF372219-D7A4-41EC-1F30-3734B11640B5}"/>
+              </a:ext>
+            </a:extLst>
+          </p:cNvPr>
+          <p:cNvSpPr txBox="1"/>
+          <p:nvPr/>
+        </p:nvSpPr>
+        <p:spPr>
+          <a:xfrm>
+            <a:off x="825042" y="15490630"/>
+            <a:ext cx="3086101" cy="646331"/>
+          </a:xfrm>
+          <a:prstGeom prst="rect">
+            <a:avLst/>
+          </a:prstGeom>
+          <a:noFill/>
+        </p:spPr>
+        <p:txBody>
+          <a:bodyPr wrap="none" rtlCol="0">
+            <a:spAutoFit/>
+          </a:bodyPr>
+          <a:lstStyle/>
+          <a:p>
+            <a:r>
+              <a:rPr lang="en-RW" sz="3600" b="1" dirty="0">
+                <a:solidFill>
+                  <a:schemeClr val="tx1"/>
+                </a:solidFill>
+                <a:latin typeface="Avenir Book" panose="02000503020000020003" pitchFamily="2" charset="0"/>
+              </a:rPr>
+              <a:t>Methodology</a:t>
+            </a:r>
+          </a:p>
+        </p:txBody>
+      </p:sp>
+      <p:sp>
+        <p:nvSpPr>
+          <p:cNvPr id="6" name="TextBox 5">
+            <a:extLst>
+              <a:ext uri="{FF2B5EF4-FFF2-40B4-BE49-F238E27FC236}">
+                <a16:creationId xmlns:a16="http://schemas.microsoft.com/office/drawing/2014/main" id="{09DC5A7A-8427-8EFF-3771-F66D05E15252}"/>
+              </a:ext>
+            </a:extLst>
+          </p:cNvPr>
+          <p:cNvSpPr txBox="1"/>
+          <p:nvPr/>
+        </p:nvSpPr>
+        <p:spPr>
+          <a:xfrm>
+            <a:off x="831138" y="26908438"/>
+            <a:ext cx="4642618" cy="646331"/>
+          </a:xfrm>
+          <a:prstGeom prst="rect">
+            <a:avLst/>
+          </a:prstGeom>
+          <a:noFill/>
+        </p:spPr>
+        <p:txBody>
+          <a:bodyPr wrap="none" rtlCol="0">
+            <a:spAutoFit/>
+          </a:bodyPr>
+          <a:lstStyle/>
+          <a:p>
+            <a:r>
+              <a:rPr lang="en-RW" sz="3600" b="1" dirty="0">
+                <a:solidFill>
+                  <a:schemeClr val="tx1"/>
+                </a:solidFill>
+                <a:latin typeface="Avenir Book" panose="02000503020000020003" pitchFamily="2" charset="0"/>
+              </a:rPr>
+              <a:t>Preliminary Findings</a:t>
             </a:r>
           </a:p>
         </p:txBody>

</xml_diff>